<commit_message>
Modelo com logotipo melhorado
</commit_message>
<xml_diff>
--- a/Modelos/Apresentação PowerPoint v3.pptx
+++ b/Modelos/Apresentação PowerPoint v3.pptx
@@ -206,7 +206,7 @@
             <a:fld id="{37A1BFF5-21BF-4160-B9BB-AE71C1FED557}" type="datetime1">
               <a:rPr lang="pt-PT" smtClean="0"/>
               <a:pPr algn="r" rtl="0"/>
-              <a:t>28/04/2015</a:t>
+              <a:t>05/05/2015</a:t>
             </a:fld>
             <a:endParaRPr lang="pt-PT" dirty="0"/>
           </a:p>
@@ -376,7 +376,7 @@
             <a:fld id="{9976EA48-158B-44E6-AD53-699CA8A0F7E6}" type="datetime1">
               <a:rPr lang="pt-PT" smtClean="0"/>
               <a:pPr/>
-              <a:t>28/04/2015</a:t>
+              <a:t>05/05/2015</a:t>
             </a:fld>
             <a:endParaRPr lang="pt-PT" dirty="0"/>
           </a:p>
@@ -906,7 +906,7 @@
             <a:pPr rtl="0"/>
             <a:fld id="{91AC7CBD-17BA-4564-A78B-867AB4D84BAF}" type="datetime1">
               <a:rPr lang="pt-PT" smtClean="0"/>
-              <a:t>28/04/2015</a:t>
+              <a:t>05/05/2015</a:t>
             </a:fld>
             <a:endParaRPr lang="pt-PT" dirty="0"/>
           </a:p>
@@ -989,7 +989,7 @@
       </p:sp>
       <p:pic>
         <p:nvPicPr>
-          <p:cNvPr id="4" name="Imagem 3"/>
+          <p:cNvPr id="14" name="Imagem 1"/>
           <p:cNvPicPr>
             <a:picLocks noChangeAspect="1"/>
           </p:cNvPicPr>
@@ -1009,8 +1009,8 @@
         </p:blipFill>
         <p:spPr>
           <a:xfrm>
-            <a:off x="8044942" y="534272"/>
-            <a:ext cx="2863850" cy="2789785"/>
+            <a:off x="6750151" y="3601373"/>
+            <a:ext cx="4158641" cy="942626"/>
           </a:xfrm>
           <a:prstGeom prst="rect">
             <a:avLst/>
@@ -1019,7 +1019,7 @@
       </p:pic>
       <p:pic>
         <p:nvPicPr>
-          <p:cNvPr id="14" name="Imagem 1"/>
+          <p:cNvPr id="5" name="Imagem 4"/>
           <p:cNvPicPr>
             <a:picLocks noChangeAspect="1"/>
           </p:cNvPicPr>
@@ -1039,8 +1039,8 @@
         </p:blipFill>
         <p:spPr>
           <a:xfrm>
-            <a:off x="6750151" y="3601373"/>
-            <a:ext cx="4158641" cy="942626"/>
+            <a:off x="8310191" y="179245"/>
+            <a:ext cx="3228303" cy="3144812"/>
           </a:xfrm>
           <a:prstGeom prst="rect">
             <a:avLst/>
@@ -1396,7 +1396,7 @@
           <a:p>
             <a:fld id="{4713F5D0-830C-4962-94A4-BBDD74DFC88D}" type="datetime1">
               <a:rPr lang="pt-PT" smtClean="0"/>
-              <a:t>28/04/2015</a:t>
+              <a:t>05/05/2015</a:t>
             </a:fld>
             <a:endParaRPr lang="pt-PT" dirty="0"/>
           </a:p>
@@ -1744,7 +1744,7 @@
             <a:pPr rtl="0"/>
             <a:fld id="{A6B0A519-FF1E-4E03-AC96-013D178F918D}" type="datetime1">
               <a:rPr lang="pt-PT" smtClean="0"/>
-              <a:t>28/04/2015</a:t>
+              <a:t>05/05/2015</a:t>
             </a:fld>
             <a:endParaRPr lang="pt-PT" dirty="0"/>
           </a:p>
@@ -2191,7 +2191,7 @@
             <a:pPr rtl="0"/>
             <a:fld id="{292DE215-9969-4DA9-B33A-A364F2EE9811}" type="datetime1">
               <a:rPr lang="pt-PT" smtClean="0"/>
-              <a:t>28/04/2015</a:t>
+              <a:t>05/05/2015</a:t>
             </a:fld>
             <a:endParaRPr lang="pt-PT" dirty="0"/>
           </a:p>
@@ -2381,7 +2381,7 @@
             <a:pPr rtl="0"/>
             <a:fld id="{6B475633-534F-45A7-B0B6-0F8F351ECD8A}" type="datetime1">
               <a:rPr lang="pt-PT" smtClean="0"/>
-              <a:t>28/04/2015</a:t>
+              <a:t>05/05/2015</a:t>
             </a:fld>
             <a:endParaRPr lang="pt-PT" dirty="0"/>
           </a:p>
@@ -2578,7 +2578,7 @@
             <a:pPr rtl="0"/>
             <a:fld id="{087C4115-C081-498D-93A4-745608AEABE8}" type="datetime1">
               <a:rPr lang="pt-PT" smtClean="0"/>
-              <a:t>28/04/2015</a:t>
+              <a:t>05/05/2015</a:t>
             </a:fld>
             <a:endParaRPr lang="pt-PT" dirty="0"/>
           </a:p>
@@ -2954,7 +2954,7 @@
             <a:pPr rtl="0"/>
             <a:fld id="{500B787E-5745-4DE6-84E9-6B3D5A80081F}" type="datetime1">
               <a:rPr lang="pt-PT" smtClean="0"/>
-              <a:t>28/04/2015</a:t>
+              <a:t>05/05/2015</a:t>
             </a:fld>
             <a:endParaRPr lang="pt-PT" dirty="0"/>
           </a:p>
@@ -3274,7 +3274,7 @@
             <a:pPr rtl="0"/>
             <a:fld id="{EFE141A0-1FB9-4DEB-ADFF-D9C472385D53}" type="datetime1">
               <a:rPr lang="pt-PT" smtClean="0"/>
-              <a:t>28/04/2015</a:t>
+              <a:t>05/05/2015</a:t>
             </a:fld>
             <a:endParaRPr lang="pt-PT" dirty="0"/>
           </a:p>
@@ -3654,7 +3654,7 @@
             <a:pPr rtl="0"/>
             <a:fld id="{A24B92E2-433E-4BF3-9426-68C5E17B33A4}" type="datetime1">
               <a:rPr lang="pt-PT" smtClean="0"/>
-              <a:t>28/04/2015</a:t>
+              <a:t>05/05/2015</a:t>
             </a:fld>
             <a:endParaRPr lang="pt-PT" dirty="0"/>
           </a:p>
@@ -4150,13 +4150,13 @@
   <p:clrMapOvr>
     <a:masterClrMapping/>
   </p:clrMapOvr>
-  <mc:AlternateContent xmlns:mc="http://schemas.openxmlformats.org/markup-compatibility/2006">
-    <mc:Choice xmlns:p14="http://schemas.microsoft.com/office/powerpoint/2010/main" Requires="p14">
+  <mc:AlternateContent xmlns:mc="http://schemas.openxmlformats.org/markup-compatibility/2006" xmlns:p14="http://schemas.microsoft.com/office/powerpoint/2010/main">
+    <mc:Choice Requires="p14">
       <p:transition spd="med" p14:dur="700">
         <p:fade/>
       </p:transition>
     </mc:Choice>
-    <mc:Fallback>
+    <mc:Fallback xmlns="">
       <p:transition spd="med">
         <p:fade/>
       </p:transition>
@@ -4949,9 +4949,12 @@
 </file>
 
 <file path=customXml/item1.xml><?xml version="1.0" encoding="utf-8"?>
-<p:properties xmlns:p="http://schemas.microsoft.com/office/2006/metadata/properties" xmlns:xsi="http://www.w3.org/2001/XMLSchema-instance" xmlns:pc="http://schemas.microsoft.com/office/infopath/2007/PartnerControls">
-  <documentManagement/>
-</p:properties>
+<?mso-contentType ?>
+<FormTemplates xmlns="http://schemas.microsoft.com/sharepoint/v3/contenttype/forms">
+  <Display>DocumentLibraryForm</Display>
+  <Edit>DocumentLibraryForm</Edit>
+  <New>DocumentLibraryForm</New>
+</FormTemplates>
 </file>
 
 <file path=customXml/item2.xml><?xml version="1.0" encoding="utf-8"?>
@@ -5069,25 +5072,15 @@
 </file>
 
 <file path=customXml/item3.xml><?xml version="1.0" encoding="utf-8"?>
-<?mso-contentType ?>
-<FormTemplates xmlns="http://schemas.microsoft.com/sharepoint/v3/contenttype/forms">
-  <Display>DocumentLibraryForm</Display>
-  <Edit>DocumentLibraryForm</Edit>
-  <New>DocumentLibraryForm</New>
-</FormTemplates>
+<p:properties xmlns:p="http://schemas.microsoft.com/office/2006/metadata/properties" xmlns:xsi="http://www.w3.org/2001/XMLSchema-instance" xmlns:pc="http://schemas.microsoft.com/office/infopath/2007/PartnerControls">
+  <documentManagement/>
+</p:properties>
 </file>
 
 <file path=customXml/itemProps1.xml><?xml version="1.0" encoding="utf-8"?>
-<ds:datastoreItem xmlns:ds="http://schemas.openxmlformats.org/officeDocument/2006/customXml" ds:itemID="{91BC99BC-3A63-4255-9D4F-38C5B80A3193}">
+<ds:datastoreItem xmlns:ds="http://schemas.openxmlformats.org/officeDocument/2006/customXml" ds:itemID="{9F7A874A-6E55-415B-9061-8B2D43DC2F48}">
   <ds:schemaRefs>
-    <ds:schemaRef ds:uri="http://purl.org/dc/terms/"/>
-    <ds:schemaRef ds:uri="http://schemas.openxmlformats.org/package/2006/metadata/core-properties"/>
-    <ds:schemaRef ds:uri="http://schemas.microsoft.com/office/2006/documentManagement/types"/>
-    <ds:schemaRef ds:uri="http://schemas.microsoft.com/office/infopath/2007/PartnerControls"/>
-    <ds:schemaRef ds:uri="http://purl.org/dc/elements/1.1/"/>
-    <ds:schemaRef ds:uri="http://schemas.microsoft.com/office/2006/metadata/properties"/>
-    <ds:schemaRef ds:uri="http://www.w3.org/XML/1998/namespace"/>
-    <ds:schemaRef ds:uri="http://purl.org/dc/dcmitype/"/>
+    <ds:schemaRef ds:uri="http://schemas.microsoft.com/sharepoint/v3/contenttype/forms"/>
   </ds:schemaRefs>
 </ds:datastoreItem>
 </file>
@@ -5109,9 +5102,16 @@
 </file>
 
 <file path=customXml/itemProps3.xml><?xml version="1.0" encoding="utf-8"?>
-<ds:datastoreItem xmlns:ds="http://schemas.openxmlformats.org/officeDocument/2006/customXml" ds:itemID="{9F7A874A-6E55-415B-9061-8B2D43DC2F48}">
+<ds:datastoreItem xmlns:ds="http://schemas.openxmlformats.org/officeDocument/2006/customXml" ds:itemID="{91BC99BC-3A63-4255-9D4F-38C5B80A3193}">
   <ds:schemaRefs>
-    <ds:schemaRef ds:uri="http://schemas.microsoft.com/sharepoint/v3/contenttype/forms"/>
+    <ds:schemaRef ds:uri="http://purl.org/dc/terms/"/>
+    <ds:schemaRef ds:uri="http://schemas.openxmlformats.org/package/2006/metadata/core-properties"/>
+    <ds:schemaRef ds:uri="http://schemas.microsoft.com/office/2006/documentManagement/types"/>
+    <ds:schemaRef ds:uri="http://schemas.microsoft.com/office/infopath/2007/PartnerControls"/>
+    <ds:schemaRef ds:uri="http://purl.org/dc/elements/1.1/"/>
+    <ds:schemaRef ds:uri="http://schemas.microsoft.com/office/2006/metadata/properties"/>
+    <ds:schemaRef ds:uri="http://www.w3.org/XML/1998/namespace"/>
+    <ds:schemaRef ds:uri="http://purl.org/dc/dcmitype/"/>
   </ds:schemaRefs>
 </ds:datastoreItem>
 </file>
</xml_diff>